<commit_message>
mise à jour du journal de bord et modification PowerPoint
</commit_message>
<xml_diff>
--- a/document/presentationSitePerso.pptx
+++ b/document/presentationSitePerso.pptx
@@ -5,10 +5,10 @@
     <p:sldMasterId id="2147483648" r:id="rId4"/>
   </p:sldMasterIdLst>
   <p:notesMasterIdLst>
-    <p:notesMasterId r:id="rId13"/>
+    <p:notesMasterId r:id="rId14"/>
   </p:notesMasterIdLst>
   <p:handoutMasterIdLst>
-    <p:handoutMasterId r:id="rId14"/>
+    <p:handoutMasterId r:id="rId15"/>
   </p:handoutMasterIdLst>
   <p:sldIdLst>
     <p:sldId id="256" r:id="rId5"/>
@@ -19,6 +19,7 @@
     <p:sldId id="260" r:id="rId10"/>
     <p:sldId id="261" r:id="rId11"/>
     <p:sldId id="263" r:id="rId12"/>
+    <p:sldId id="264" r:id="rId13"/>
   </p:sldIdLst>
   <p:sldSz cx="12192000" cy="6858000"/>
   <p:notesSz cx="6858000" cy="9144000"/>
@@ -223,7 +224,7 @@
             <a:pPr rtl="0"/>
             <a:fld id="{457283C4-69C4-4B10-9EB4-C99EB4AB0E72}" type="datetime1">
               <a:rPr lang="fr-FR" smtClean="0"/>
-              <a:t>13/10/2022</a:t>
+              <a:t>17/10/2022</a:t>
             </a:fld>
             <a:endParaRPr lang="fr-FR"/>
           </a:p>
@@ -393,7 +394,7 @@
             <a:pPr rtl="0"/>
             <a:fld id="{E7D04816-4A16-4B9A-8B75-D40768E67554}" type="datetime1">
               <a:rPr lang="fr-FR" noProof="0" smtClean="0"/>
-              <a:t>13/10/2022</a:t>
+              <a:t>17/10/2022</a:t>
             </a:fld>
             <a:endParaRPr lang="fr-FR" noProof="0"/>
           </a:p>
@@ -1133,7 +1134,7 @@
             <a:pPr rtl="0"/>
             <a:fld id="{F4839ECD-B0F4-4E9C-8A41-C7FF6F05ABC7}" type="datetime1">
               <a:rPr lang="fr-FR" noProof="0" smtClean="0"/>
-              <a:t>13/10/2022</a:t>
+              <a:t>17/10/2022</a:t>
             </a:fld>
             <a:endParaRPr lang="fr-FR" noProof="0"/>
           </a:p>
@@ -1430,7 +1431,7 @@
             <a:pPr rtl="0"/>
             <a:fld id="{3B7C5CE0-6D1B-424F-996A-7CF1236C9093}" type="datetime1">
               <a:rPr lang="fr-FR" noProof="0" smtClean="0"/>
-              <a:t>13/10/2022</a:t>
+              <a:t>17/10/2022</a:t>
             </a:fld>
             <a:endParaRPr lang="fr-FR" noProof="0"/>
           </a:p>
@@ -1635,7 +1636,7 @@
             <a:pPr rtl="0"/>
             <a:fld id="{4BBCED7F-8361-4784-80FC-58B2367AC205}" type="datetime1">
               <a:rPr lang="fr-FR" noProof="0" smtClean="0"/>
-              <a:t>13/10/2022</a:t>
+              <a:t>17/10/2022</a:t>
             </a:fld>
             <a:endParaRPr lang="fr-FR" noProof="0"/>
           </a:p>
@@ -1888,7 +1889,7 @@
             <a:pPr rtl="0"/>
             <a:fld id="{FCC782E0-924C-4C80-878E-1A91F4E2D435}" type="datetime1">
               <a:rPr lang="fr-FR" smtClean="0"/>
-              <a:t>13/10/2022</a:t>
+              <a:t>17/10/2022</a:t>
             </a:fld>
             <a:endParaRPr lang="fr-FR" dirty="0"/>
           </a:p>
@@ -2159,7 +2160,7 @@
             <a:pPr rtl="0"/>
             <a:fld id="{9B246BB8-95D5-4925-A156-AFC4162AE5A9}" type="datetime1">
               <a:rPr lang="fr-FR" noProof="0" smtClean="0"/>
-              <a:t>13/10/2022</a:t>
+              <a:t>17/10/2022</a:t>
             </a:fld>
             <a:endParaRPr lang="fr-FR" noProof="0"/>
           </a:p>
@@ -3191,7 +3192,7 @@
             <a:pPr rtl="0"/>
             <a:fld id="{EE95B23C-F89E-4A0C-B025-739D1C093814}" type="datetime1">
               <a:rPr lang="fr-FR" noProof="0" smtClean="0"/>
-              <a:t>13/10/2022</a:t>
+              <a:t>17/10/2022</a:t>
             </a:fld>
             <a:endParaRPr lang="fr-FR" noProof="0"/>
           </a:p>
@@ -3465,7 +3466,7 @@
             <a:pPr rtl="0"/>
             <a:fld id="{157D3DD3-58BE-41AA-B645-7E41A687D1FB}" type="datetime1">
               <a:rPr lang="fr-FR" noProof="0" smtClean="0"/>
-              <a:t>13/10/2022</a:t>
+              <a:t>17/10/2022</a:t>
             </a:fld>
             <a:endParaRPr lang="fr-FR" noProof="0"/>
           </a:p>
@@ -3846,7 +3847,7 @@
             <a:pPr rtl="0"/>
             <a:fld id="{AB2A5C24-7937-4C9A-B774-F693B38FC3A3}" type="datetime1">
               <a:rPr lang="fr-FR" noProof="0" smtClean="0"/>
-              <a:t>13/10/2022</a:t>
+              <a:t>17/10/2022</a:t>
             </a:fld>
             <a:endParaRPr lang="fr-FR" noProof="0"/>
           </a:p>
@@ -3979,7 +3980,7 @@
             <a:pPr rtl="0"/>
             <a:fld id="{B79A013D-9941-4648-9393-6D6C3D9A3531}" type="datetime1">
               <a:rPr lang="fr-FR" noProof="0" smtClean="0"/>
-              <a:t>13/10/2022</a:t>
+              <a:t>17/10/2022</a:t>
             </a:fld>
             <a:endParaRPr lang="fr-FR" noProof="0"/>
           </a:p>
@@ -4089,7 +4090,7 @@
             <a:pPr rtl="0"/>
             <a:fld id="{62DD9261-D922-4D8A-993C-015074B78B12}" type="datetime1">
               <a:rPr lang="fr-FR" noProof="0" smtClean="0"/>
-              <a:t>13/10/2022</a:t>
+              <a:t>17/10/2022</a:t>
             </a:fld>
             <a:endParaRPr lang="fr-FR" noProof="0"/>
           </a:p>
@@ -4382,7 +4383,7 @@
             <a:pPr rtl="0"/>
             <a:fld id="{6540C66C-A21E-4010-856D-58DDEC1C5A07}" type="datetime1">
               <a:rPr lang="fr-FR" noProof="0" smtClean="0"/>
-              <a:t>13/10/2022</a:t>
+              <a:t>17/10/2022</a:t>
             </a:fld>
             <a:endParaRPr lang="fr-FR" noProof="0"/>
           </a:p>
@@ -4637,7 +4638,7 @@
             <a:pPr rtl="0"/>
             <a:fld id="{7ED33F8C-BA28-4341-BFF2-691DB4C88DBD}" type="datetime1">
               <a:rPr lang="fr-FR" noProof="0" smtClean="0"/>
-              <a:t>13/10/2022</a:t>
+              <a:t>17/10/2022</a:t>
             </a:fld>
             <a:endParaRPr lang="fr-FR" noProof="0"/>
           </a:p>
@@ -5201,10 +5202,9 @@
               <a:rPr lang="fr-FR" dirty="0"/>
             </a:br>
             <a:r>
-              <a:rPr lang="fr-FR" dirty="0" err="1"/>
+              <a:rPr lang="fr-FR" dirty="0"/>
               <a:t>yOBOOK</a:t>
             </a:r>
-            <a:endParaRPr lang="fr-FR" dirty="0"/>
           </a:p>
         </p:txBody>
       </p:sp>
@@ -5377,6 +5377,13 @@
               <a:t>Code</a:t>
             </a:r>
           </a:p>
+          <a:p>
+            <a:pPr rtl="0"/>
+            <a:r>
+              <a:rPr lang="fr-FR" dirty="0"/>
+              <a:t>Conclusion</a:t>
+            </a:r>
+          </a:p>
         </p:txBody>
       </p:sp>
     </p:spTree>
@@ -5775,7 +5782,7 @@
           <a:p>
             <a:r>
               <a:rPr lang="fr-CH" dirty="0"/>
-              <a:t>Markdown pour le journal de bord</a:t>
+              <a:t>Markdown pour la documentation</a:t>
             </a:r>
           </a:p>
         </p:txBody>
@@ -5961,31 +5968,6 @@
           </a:p>
         </p:txBody>
       </p:sp>
-      <p:sp>
-        <p:nvSpPr>
-          <p:cNvPr id="3" name="Espace réservé du texte 2">
-            <a:extLst>
-              <a:ext uri="{FF2B5EF4-FFF2-40B4-BE49-F238E27FC236}">
-                <a16:creationId xmlns:a16="http://schemas.microsoft.com/office/drawing/2014/main" id="{F23FCB88-C99F-B4EC-FBFC-43627732F8F8}"/>
-              </a:ext>
-            </a:extLst>
-          </p:cNvPr>
-          <p:cNvSpPr>
-            <a:spLocks noGrp="1"/>
-          </p:cNvSpPr>
-          <p:nvPr>
-            <p:ph type="body" idx="1"/>
-          </p:nvPr>
-        </p:nvSpPr>
-        <p:spPr/>
-        <p:txBody>
-          <a:bodyPr/>
-          <a:lstStyle/>
-          <a:p>
-            <a:endParaRPr lang="fr-CH"/>
-          </a:p>
-        </p:txBody>
-      </p:sp>
     </p:spTree>
     <p:extLst>
       <p:ext uri="{BB962C8B-B14F-4D97-AF65-F5344CB8AC3E}">
@@ -6065,42 +6047,6 @@
       </p:sp>
       <p:pic>
         <p:nvPicPr>
-          <p:cNvPr id="5" name="Espace réservé du contenu 4" descr="Une image contenant texte&#10;&#10;Description générée automatiquement">
-            <a:extLst>
-              <a:ext uri="{FF2B5EF4-FFF2-40B4-BE49-F238E27FC236}">
-                <a16:creationId xmlns:a16="http://schemas.microsoft.com/office/drawing/2014/main" id="{802ABAEB-C600-76BA-5B6D-078EEB7DB040}"/>
-              </a:ext>
-            </a:extLst>
-          </p:cNvPr>
-          <p:cNvPicPr>
-            <a:picLocks noGrp="1" noChangeAspect="1"/>
-          </p:cNvPicPr>
-          <p:nvPr>
-            <p:ph idx="1"/>
-          </p:nvPr>
-        </p:nvPicPr>
-        <p:blipFill>
-          <a:blip r:embed="rId2">
-            <a:extLst>
-              <a:ext uri="{28A0092B-C50C-407E-A947-70E740481C1C}">
-                <a14:useLocalDpi xmlns:a14="http://schemas.microsoft.com/office/drawing/2010/main" val="0"/>
-              </a:ext>
-            </a:extLst>
-          </a:blip>
-          <a:stretch>
-            <a:fillRect/>
-          </a:stretch>
-        </p:blipFill>
-        <p:spPr>
-          <a:xfrm>
-            <a:off x="2063691" y="2100761"/>
-            <a:ext cx="6970313" cy="4757239"/>
-          </a:xfrm>
-          <a:noFill/>
-        </p:spPr>
-      </p:pic>
-      <p:pic>
-        <p:nvPicPr>
           <p:cNvPr id="7" name="Image 6">
             <a:extLst>
               <a:ext uri="{FF2B5EF4-FFF2-40B4-BE49-F238E27FC236}">
@@ -6114,7 +6060,7 @@
           <p:nvPr/>
         </p:nvPicPr>
         <p:blipFill>
-          <a:blip r:embed="rId3">
+          <a:blip r:embed="rId2">
             <a:extLst>
               <a:ext uri="{28A0092B-C50C-407E-A947-70E740481C1C}">
                 <a14:useLocalDpi xmlns:a14="http://schemas.microsoft.com/office/drawing/2010/main" val="0"/>
@@ -6135,10 +6081,151 @@
           </a:prstGeom>
         </p:spPr>
       </p:pic>
+      <p:pic>
+        <p:nvPicPr>
+          <p:cNvPr id="8" name="Espace réservé du contenu 7">
+            <a:extLst>
+              <a:ext uri="{FF2B5EF4-FFF2-40B4-BE49-F238E27FC236}">
+                <a16:creationId xmlns:a16="http://schemas.microsoft.com/office/drawing/2014/main" id="{D386E515-5BF3-02E2-FC03-862AFD5185B8}"/>
+              </a:ext>
+            </a:extLst>
+          </p:cNvPr>
+          <p:cNvPicPr>
+            <a:picLocks noGrp="1" noChangeAspect="1"/>
+          </p:cNvPicPr>
+          <p:nvPr>
+            <p:ph idx="1"/>
+          </p:nvPr>
+        </p:nvPicPr>
+        <p:blipFill>
+          <a:blip r:embed="rId3">
+            <a:extLst>
+              <a:ext uri="{28A0092B-C50C-407E-A947-70E740481C1C}">
+                <a14:useLocalDpi xmlns:a14="http://schemas.microsoft.com/office/drawing/2010/main" val="0"/>
+              </a:ext>
+            </a:extLst>
+          </a:blip>
+          <a:stretch>
+            <a:fillRect/>
+          </a:stretch>
+        </p:blipFill>
+        <p:spPr>
+          <a:xfrm>
+            <a:off x="1834304" y="2075376"/>
+            <a:ext cx="7438480" cy="4706424"/>
+          </a:xfrm>
+        </p:spPr>
+      </p:pic>
     </p:spTree>
     <p:extLst>
       <p:ext uri="{BB962C8B-B14F-4D97-AF65-F5344CB8AC3E}">
         <p14:creationId xmlns:p14="http://schemas.microsoft.com/office/powerpoint/2010/main" val="3788193282"/>
+      </p:ext>
+    </p:extLst>
+  </p:cSld>
+  <p:clrMapOvr>
+    <a:masterClrMapping/>
+  </p:clrMapOvr>
+  <mc:AlternateContent xmlns:mc="http://schemas.openxmlformats.org/markup-compatibility/2006" xmlns:p14="http://schemas.microsoft.com/office/powerpoint/2010/main">
+    <mc:Choice Requires="p14">
+      <p:transition spd="med" p14:dur="700">
+        <p:fade/>
+      </p:transition>
+    </mc:Choice>
+    <mc:Fallback xmlns="">
+      <p:transition spd="med">
+        <p:fade/>
+      </p:transition>
+    </mc:Fallback>
+  </mc:AlternateContent>
+</p:sld>
+</file>
+
+<file path=ppt/slides/slide9.xml><?xml version="1.0" encoding="utf-8"?>
+<p:sld xmlns:a="http://schemas.openxmlformats.org/drawingml/2006/main" xmlns:r="http://schemas.openxmlformats.org/officeDocument/2006/relationships" xmlns:p="http://schemas.openxmlformats.org/presentationml/2006/main">
+  <p:cSld>
+    <p:spTree>
+      <p:nvGrpSpPr>
+        <p:cNvPr id="1" name=""/>
+        <p:cNvGrpSpPr/>
+        <p:nvPr/>
+      </p:nvGrpSpPr>
+      <p:grpSpPr>
+        <a:xfrm>
+          <a:off x="0" y="0"/>
+          <a:ext cx="0" cy="0"/>
+          <a:chOff x="0" y="0"/>
+          <a:chExt cx="0" cy="0"/>
+        </a:xfrm>
+      </p:grpSpPr>
+      <p:sp>
+        <p:nvSpPr>
+          <p:cNvPr id="2" name="Titre 1">
+            <a:extLst>
+              <a:ext uri="{FF2B5EF4-FFF2-40B4-BE49-F238E27FC236}">
+                <a16:creationId xmlns:a16="http://schemas.microsoft.com/office/drawing/2014/main" id="{0AD72E73-7DB5-50AD-3E76-6E28BEB8A49D}"/>
+              </a:ext>
+            </a:extLst>
+          </p:cNvPr>
+          <p:cNvSpPr>
+            <a:spLocks noGrp="1"/>
+          </p:cNvSpPr>
+          <p:nvPr>
+            <p:ph type="title"/>
+          </p:nvPr>
+        </p:nvSpPr>
+        <p:spPr/>
+        <p:txBody>
+          <a:bodyPr/>
+          <a:lstStyle/>
+          <a:p>
+            <a:r>
+              <a:rPr lang="fr-FR" dirty="0"/>
+              <a:t>Conclusion</a:t>
+            </a:r>
+            <a:endParaRPr lang="fr-CH" dirty="0"/>
+          </a:p>
+        </p:txBody>
+      </p:sp>
+      <p:sp>
+        <p:nvSpPr>
+          <p:cNvPr id="3" name="Espace réservé du contenu 2">
+            <a:extLst>
+              <a:ext uri="{FF2B5EF4-FFF2-40B4-BE49-F238E27FC236}">
+                <a16:creationId xmlns:a16="http://schemas.microsoft.com/office/drawing/2014/main" id="{6CF60191-2030-C114-D2AD-FB6ACD3EBC9D}"/>
+              </a:ext>
+            </a:extLst>
+          </p:cNvPr>
+          <p:cNvSpPr>
+            <a:spLocks noGrp="1"/>
+          </p:cNvSpPr>
+          <p:nvPr>
+            <p:ph idx="1"/>
+          </p:nvPr>
+        </p:nvSpPr>
+        <p:spPr/>
+        <p:txBody>
+          <a:bodyPr/>
+          <a:lstStyle/>
+          <a:p>
+            <a:r>
+              <a:rPr lang="fr-FR" dirty="0"/>
+              <a:t>Projet très intéressant et enrichissant</a:t>
+            </a:r>
+          </a:p>
+          <a:p>
+            <a:r>
+              <a:rPr lang="fr-FR" dirty="0"/>
+              <a:t>Les 3 différentes versions du site montrent mon évolution personnel au cours de la formation.</a:t>
+            </a:r>
+            <a:endParaRPr lang="fr-CH" dirty="0"/>
+          </a:p>
+        </p:txBody>
+      </p:sp>
+    </p:spTree>
+    <p:extLst>
+      <p:ext uri="{BB962C8B-B14F-4D97-AF65-F5344CB8AC3E}">
+        <p14:creationId xmlns:p14="http://schemas.microsoft.com/office/powerpoint/2010/main" val="1214388019"/>
       </p:ext>
     </p:extLst>
   </p:cSld>
@@ -6908,6 +6995,132 @@
 </file>
 
 <file path=customXml/item1.xml><?xml version="1.0" encoding="utf-8"?>
+<p:properties xmlns:p="http://schemas.microsoft.com/office/2006/metadata/properties" xmlns:xsi="http://www.w3.org/2001/XMLSchema-instance" xmlns:pc="http://schemas.microsoft.com/office/infopath/2007/PartnerControls">
+  <documentManagement>
+    <APDescription xmlns="4873beb7-5857-4685-be1f-d57550cc96cc" xsi:nil="true"/>
+    <AssetExpire xmlns="4873beb7-5857-4685-be1f-d57550cc96cc">2029-01-01T08:00:00+00:00</AssetExpire>
+    <CampaignTagsTaxHTField0 xmlns="4873beb7-5857-4685-be1f-d57550cc96cc">
+      <Terms xmlns="http://schemas.microsoft.com/office/infopath/2007/PartnerControls"/>
+    </CampaignTagsTaxHTField0>
+    <IntlLangReviewDate xmlns="4873beb7-5857-4685-be1f-d57550cc96cc" xsi:nil="true"/>
+    <TPFriendlyName xmlns="4873beb7-5857-4685-be1f-d57550cc96cc" xsi:nil="true"/>
+    <IntlLangReview xmlns="4873beb7-5857-4685-be1f-d57550cc96cc">false</IntlLangReview>
+    <LocLastLocAttemptVersionLookup xmlns="4873beb7-5857-4685-be1f-d57550cc96cc">855024</LocLastLocAttemptVersionLookup>
+    <PolicheckWords xmlns="4873beb7-5857-4685-be1f-d57550cc96cc" xsi:nil="true"/>
+    <SubmitterId xmlns="4873beb7-5857-4685-be1f-d57550cc96cc" xsi:nil="true"/>
+    <AcquiredFrom xmlns="4873beb7-5857-4685-be1f-d57550cc96cc">Internal MS</AcquiredFrom>
+    <EditorialStatus xmlns="4873beb7-5857-4685-be1f-d57550cc96cc">Complete</EditorialStatus>
+    <Markets xmlns="4873beb7-5857-4685-be1f-d57550cc96cc"/>
+    <OriginAsset xmlns="4873beb7-5857-4685-be1f-d57550cc96cc" xsi:nil="true"/>
+    <AssetStart xmlns="4873beb7-5857-4685-be1f-d57550cc96cc">2012-08-31T08:50:00+00:00</AssetStart>
+    <FriendlyTitle xmlns="4873beb7-5857-4685-be1f-d57550cc96cc" xsi:nil="true"/>
+    <MarketSpecific xmlns="4873beb7-5857-4685-be1f-d57550cc96cc">false</MarketSpecific>
+    <TPNamespace xmlns="4873beb7-5857-4685-be1f-d57550cc96cc" xsi:nil="true"/>
+    <PublishStatusLookup xmlns="4873beb7-5857-4685-be1f-d57550cc96cc">
+      <Value>1616423</Value>
+    </PublishStatusLookup>
+    <APAuthor xmlns="4873beb7-5857-4685-be1f-d57550cc96cc">
+      <UserInfo>
+        <DisplayName>REDMOND\kristaa</DisplayName>
+        <AccountId>136</AccountId>
+        <AccountType/>
+      </UserInfo>
+    </APAuthor>
+    <TPCommandLine xmlns="4873beb7-5857-4685-be1f-d57550cc96cc" xsi:nil="true"/>
+    <IntlLangReviewer xmlns="4873beb7-5857-4685-be1f-d57550cc96cc" xsi:nil="true"/>
+    <OpenTemplate xmlns="4873beb7-5857-4685-be1f-d57550cc96cc">true</OpenTemplate>
+    <CSXSubmissionDate xmlns="4873beb7-5857-4685-be1f-d57550cc96cc" xsi:nil="true"/>
+    <TaxCatchAll xmlns="4873beb7-5857-4685-be1f-d57550cc96cc"/>
+    <Manager xmlns="4873beb7-5857-4685-be1f-d57550cc96cc" xsi:nil="true"/>
+    <NumericId xmlns="4873beb7-5857-4685-be1f-d57550cc96cc" xsi:nil="true"/>
+    <ParentAssetId xmlns="4873beb7-5857-4685-be1f-d57550cc96cc" xsi:nil="true"/>
+    <OriginalSourceMarket xmlns="4873beb7-5857-4685-be1f-d57550cc96cc" xsi:nil="true"/>
+    <ApprovalStatus xmlns="4873beb7-5857-4685-be1f-d57550cc96cc">InProgress</ApprovalStatus>
+    <TPComponent xmlns="4873beb7-5857-4685-be1f-d57550cc96cc" xsi:nil="true"/>
+    <EditorialTags xmlns="4873beb7-5857-4685-be1f-d57550cc96cc" xsi:nil="true"/>
+    <TPExecutable xmlns="4873beb7-5857-4685-be1f-d57550cc96cc" xsi:nil="true"/>
+    <TPLaunchHelpLink xmlns="4873beb7-5857-4685-be1f-d57550cc96cc" xsi:nil="true"/>
+    <LocComments xmlns="4873beb7-5857-4685-be1f-d57550cc96cc" xsi:nil="true"/>
+    <LocRecommendedHandoff xmlns="4873beb7-5857-4685-be1f-d57550cc96cc" xsi:nil="true"/>
+    <SourceTitle xmlns="4873beb7-5857-4685-be1f-d57550cc96cc" xsi:nil="true"/>
+    <CSXUpdate xmlns="4873beb7-5857-4685-be1f-d57550cc96cc">false</CSXUpdate>
+    <IntlLocPriority xmlns="4873beb7-5857-4685-be1f-d57550cc96cc" xsi:nil="true"/>
+    <UAProjectedTotalWords xmlns="4873beb7-5857-4685-be1f-d57550cc96cc" xsi:nil="true"/>
+    <AssetType xmlns="4873beb7-5857-4685-be1f-d57550cc96cc">TP</AssetType>
+    <MachineTranslated xmlns="4873beb7-5857-4685-be1f-d57550cc96cc">false</MachineTranslated>
+    <OutputCachingOn xmlns="4873beb7-5857-4685-be1f-d57550cc96cc">false</OutputCachingOn>
+    <TemplateStatus xmlns="4873beb7-5857-4685-be1f-d57550cc96cc">Complete</TemplateStatus>
+    <IsSearchable xmlns="4873beb7-5857-4685-be1f-d57550cc96cc">true</IsSearchable>
+    <ContentItem xmlns="4873beb7-5857-4685-be1f-d57550cc96cc" xsi:nil="true"/>
+    <HandoffToMSDN xmlns="4873beb7-5857-4685-be1f-d57550cc96cc" xsi:nil="true"/>
+    <ShowIn xmlns="4873beb7-5857-4685-be1f-d57550cc96cc">Show everywhere</ShowIn>
+    <ThumbnailAssetId xmlns="4873beb7-5857-4685-be1f-d57550cc96cc" xsi:nil="true"/>
+    <UALocComments xmlns="4873beb7-5857-4685-be1f-d57550cc96cc" xsi:nil="true"/>
+    <UALocRecommendation xmlns="4873beb7-5857-4685-be1f-d57550cc96cc">Localize</UALocRecommendation>
+    <LastModifiedDateTime xmlns="4873beb7-5857-4685-be1f-d57550cc96cc" xsi:nil="true"/>
+    <LegacyData xmlns="4873beb7-5857-4685-be1f-d57550cc96cc" xsi:nil="true"/>
+    <LocManualTestRequired xmlns="4873beb7-5857-4685-be1f-d57550cc96cc">false</LocManualTestRequired>
+    <LocMarketGroupTiers2 xmlns="4873beb7-5857-4685-be1f-d57550cc96cc" xsi:nil="true"/>
+    <ClipArtFilename xmlns="4873beb7-5857-4685-be1f-d57550cc96cc" xsi:nil="true"/>
+    <TPApplication xmlns="4873beb7-5857-4685-be1f-d57550cc96cc" xsi:nil="true"/>
+    <CSXHash xmlns="4873beb7-5857-4685-be1f-d57550cc96cc" xsi:nil="true"/>
+    <DirectSourceMarket xmlns="4873beb7-5857-4685-be1f-d57550cc96cc" xsi:nil="true"/>
+    <PrimaryImageGen xmlns="4873beb7-5857-4685-be1f-d57550cc96cc">true</PrimaryImageGen>
+    <PlannedPubDate xmlns="4873beb7-5857-4685-be1f-d57550cc96cc" xsi:nil="true"/>
+    <CSXSubmissionMarket xmlns="4873beb7-5857-4685-be1f-d57550cc96cc" xsi:nil="true"/>
+    <Downloads xmlns="4873beb7-5857-4685-be1f-d57550cc96cc">0</Downloads>
+    <ArtSampleDocs xmlns="4873beb7-5857-4685-be1f-d57550cc96cc" xsi:nil="true"/>
+    <TrustLevel xmlns="4873beb7-5857-4685-be1f-d57550cc96cc">1 Microsoft Managed Content</TrustLevel>
+    <BlockPublish xmlns="4873beb7-5857-4685-be1f-d57550cc96cc">false</BlockPublish>
+    <TPLaunchHelpLinkType xmlns="4873beb7-5857-4685-be1f-d57550cc96cc">Template</TPLaunchHelpLinkType>
+    <LocalizationTagsTaxHTField0 xmlns="4873beb7-5857-4685-be1f-d57550cc96cc">
+      <Terms xmlns="http://schemas.microsoft.com/office/infopath/2007/PartnerControls"/>
+    </LocalizationTagsTaxHTField0>
+    <BusinessGroup xmlns="4873beb7-5857-4685-be1f-d57550cc96cc" xsi:nil="true"/>
+    <Providers xmlns="4873beb7-5857-4685-be1f-d57550cc96cc" xsi:nil="true"/>
+    <TemplateTemplateType xmlns="4873beb7-5857-4685-be1f-d57550cc96cc">PowerPoint Presentation Template</TemplateTemplateType>
+    <TimesCloned xmlns="4873beb7-5857-4685-be1f-d57550cc96cc" xsi:nil="true"/>
+    <TPAppVersion xmlns="4873beb7-5857-4685-be1f-d57550cc96cc" xsi:nil="true"/>
+    <VoteCount xmlns="4873beb7-5857-4685-be1f-d57550cc96cc" xsi:nil="true"/>
+    <AverageRating xmlns="4873beb7-5857-4685-be1f-d57550cc96cc" xsi:nil="true"/>
+    <FeatureTagsTaxHTField0 xmlns="4873beb7-5857-4685-be1f-d57550cc96cc">
+      <Terms xmlns="http://schemas.microsoft.com/office/infopath/2007/PartnerControls"/>
+    </FeatureTagsTaxHTField0>
+    <Provider xmlns="4873beb7-5857-4685-be1f-d57550cc96cc" xsi:nil="true"/>
+    <UACurrentWords xmlns="4873beb7-5857-4685-be1f-d57550cc96cc" xsi:nil="true"/>
+    <AssetId xmlns="4873beb7-5857-4685-be1f-d57550cc96cc">TP103431361</AssetId>
+    <TPClientViewer xmlns="4873beb7-5857-4685-be1f-d57550cc96cc" xsi:nil="true"/>
+    <DSATActionTaken xmlns="4873beb7-5857-4685-be1f-d57550cc96cc" xsi:nil="true"/>
+    <APEditor xmlns="4873beb7-5857-4685-be1f-d57550cc96cc">
+      <UserInfo>
+        <DisplayName/>
+        <AccountId xsi:nil="true"/>
+        <AccountType/>
+      </UserInfo>
+    </APEditor>
+    <TPInstallLocation xmlns="4873beb7-5857-4685-be1f-d57550cc96cc" xsi:nil="true"/>
+    <OOCacheId xmlns="4873beb7-5857-4685-be1f-d57550cc96cc" xsi:nil="true"/>
+    <IsDeleted xmlns="4873beb7-5857-4685-be1f-d57550cc96cc">false</IsDeleted>
+    <PublishTargets xmlns="4873beb7-5857-4685-be1f-d57550cc96cc">OfficeOnlineVNext</PublishTargets>
+    <ApprovalLog xmlns="4873beb7-5857-4685-be1f-d57550cc96cc" xsi:nil="true"/>
+    <BugNumber xmlns="4873beb7-5857-4685-be1f-d57550cc96cc" xsi:nil="true"/>
+    <CrawlForDependencies xmlns="4873beb7-5857-4685-be1f-d57550cc96cc">false</CrawlForDependencies>
+    <InternalTagsTaxHTField0 xmlns="4873beb7-5857-4685-be1f-d57550cc96cc">
+      <Terms xmlns="http://schemas.microsoft.com/office/infopath/2007/PartnerControls"/>
+    </InternalTagsTaxHTField0>
+    <LastHandOff xmlns="4873beb7-5857-4685-be1f-d57550cc96cc" xsi:nil="true"/>
+    <Milestone xmlns="4873beb7-5857-4685-be1f-d57550cc96cc" xsi:nil="true"/>
+    <OriginalRelease xmlns="4873beb7-5857-4685-be1f-d57550cc96cc">15</OriginalRelease>
+    <RecommendationsModifier xmlns="4873beb7-5857-4685-be1f-d57550cc96cc" xsi:nil="true"/>
+    <ScenarioTagsTaxHTField0 xmlns="4873beb7-5857-4685-be1f-d57550cc96cc">
+      <Terms xmlns="http://schemas.microsoft.com/office/infopath/2007/PartnerControls"/>
+    </ScenarioTagsTaxHTField0>
+    <UANotes xmlns="4873beb7-5857-4685-be1f-d57550cc96cc" xsi:nil="true"/>
+  </documentManagement>
+</p:properties>
+</file>
+
+<file path=customXml/item2.xml><?xml version="1.0" encoding="utf-8"?>
 <ct:contentTypeSchema xmlns:ct="http://schemas.microsoft.com/office/2006/metadata/contentType" xmlns:ma="http://schemas.microsoft.com/office/2006/metadata/properties/metaAttributes" ct:_="" ma:_="" ma:contentTypeName="TemplateFile" ma:contentTypeID="0x0101006EDDDB5EE6D98C44930B742096920B300400F5B6D36B3EF94B4E9A635CDF2A18F5B8" ma:contentTypeVersion="72" ma:contentTypeDescription="Create a new document." ma:contentTypeScope="" ma:versionID="a23e56308344d904b51738559c3d67c9">
   <xsd:schema xmlns:xsd="http://www.w3.org/2001/XMLSchema" xmlns:xs="http://www.w3.org/2001/XMLSchema" xmlns:p="http://schemas.microsoft.com/office/2006/metadata/properties" xmlns:ns2="4873beb7-5857-4685-be1f-d57550cc96cc" targetNamespace="http://schemas.microsoft.com/office/2006/metadata/properties" ma:root="true" ma:fieldsID="cd0908cc4600e77bf5da051303e00c8d" ns2:_="">
     <xsd:import namespace="4873beb7-5857-4685-be1f-d57550cc96cc"/>
@@ -7947,132 +8160,6 @@
 </ct:contentTypeSchema>
 </file>
 
-<file path=customXml/item2.xml><?xml version="1.0" encoding="utf-8"?>
-<p:properties xmlns:p="http://schemas.microsoft.com/office/2006/metadata/properties" xmlns:xsi="http://www.w3.org/2001/XMLSchema-instance" xmlns:pc="http://schemas.microsoft.com/office/infopath/2007/PartnerControls">
-  <documentManagement>
-    <APDescription xmlns="4873beb7-5857-4685-be1f-d57550cc96cc" xsi:nil="true"/>
-    <AssetExpire xmlns="4873beb7-5857-4685-be1f-d57550cc96cc">2029-01-01T08:00:00+00:00</AssetExpire>
-    <CampaignTagsTaxHTField0 xmlns="4873beb7-5857-4685-be1f-d57550cc96cc">
-      <Terms xmlns="http://schemas.microsoft.com/office/infopath/2007/PartnerControls"/>
-    </CampaignTagsTaxHTField0>
-    <IntlLangReviewDate xmlns="4873beb7-5857-4685-be1f-d57550cc96cc" xsi:nil="true"/>
-    <TPFriendlyName xmlns="4873beb7-5857-4685-be1f-d57550cc96cc" xsi:nil="true"/>
-    <IntlLangReview xmlns="4873beb7-5857-4685-be1f-d57550cc96cc">false</IntlLangReview>
-    <LocLastLocAttemptVersionLookup xmlns="4873beb7-5857-4685-be1f-d57550cc96cc">855024</LocLastLocAttemptVersionLookup>
-    <PolicheckWords xmlns="4873beb7-5857-4685-be1f-d57550cc96cc" xsi:nil="true"/>
-    <SubmitterId xmlns="4873beb7-5857-4685-be1f-d57550cc96cc" xsi:nil="true"/>
-    <AcquiredFrom xmlns="4873beb7-5857-4685-be1f-d57550cc96cc">Internal MS</AcquiredFrom>
-    <EditorialStatus xmlns="4873beb7-5857-4685-be1f-d57550cc96cc">Complete</EditorialStatus>
-    <Markets xmlns="4873beb7-5857-4685-be1f-d57550cc96cc"/>
-    <OriginAsset xmlns="4873beb7-5857-4685-be1f-d57550cc96cc" xsi:nil="true"/>
-    <AssetStart xmlns="4873beb7-5857-4685-be1f-d57550cc96cc">2012-08-31T08:50:00+00:00</AssetStart>
-    <FriendlyTitle xmlns="4873beb7-5857-4685-be1f-d57550cc96cc" xsi:nil="true"/>
-    <MarketSpecific xmlns="4873beb7-5857-4685-be1f-d57550cc96cc">false</MarketSpecific>
-    <TPNamespace xmlns="4873beb7-5857-4685-be1f-d57550cc96cc" xsi:nil="true"/>
-    <PublishStatusLookup xmlns="4873beb7-5857-4685-be1f-d57550cc96cc">
-      <Value>1616423</Value>
-    </PublishStatusLookup>
-    <APAuthor xmlns="4873beb7-5857-4685-be1f-d57550cc96cc">
-      <UserInfo>
-        <DisplayName>REDMOND\kristaa</DisplayName>
-        <AccountId>136</AccountId>
-        <AccountType/>
-      </UserInfo>
-    </APAuthor>
-    <TPCommandLine xmlns="4873beb7-5857-4685-be1f-d57550cc96cc" xsi:nil="true"/>
-    <IntlLangReviewer xmlns="4873beb7-5857-4685-be1f-d57550cc96cc" xsi:nil="true"/>
-    <OpenTemplate xmlns="4873beb7-5857-4685-be1f-d57550cc96cc">true</OpenTemplate>
-    <CSXSubmissionDate xmlns="4873beb7-5857-4685-be1f-d57550cc96cc" xsi:nil="true"/>
-    <TaxCatchAll xmlns="4873beb7-5857-4685-be1f-d57550cc96cc"/>
-    <Manager xmlns="4873beb7-5857-4685-be1f-d57550cc96cc" xsi:nil="true"/>
-    <NumericId xmlns="4873beb7-5857-4685-be1f-d57550cc96cc" xsi:nil="true"/>
-    <ParentAssetId xmlns="4873beb7-5857-4685-be1f-d57550cc96cc" xsi:nil="true"/>
-    <OriginalSourceMarket xmlns="4873beb7-5857-4685-be1f-d57550cc96cc" xsi:nil="true"/>
-    <ApprovalStatus xmlns="4873beb7-5857-4685-be1f-d57550cc96cc">InProgress</ApprovalStatus>
-    <TPComponent xmlns="4873beb7-5857-4685-be1f-d57550cc96cc" xsi:nil="true"/>
-    <EditorialTags xmlns="4873beb7-5857-4685-be1f-d57550cc96cc" xsi:nil="true"/>
-    <TPExecutable xmlns="4873beb7-5857-4685-be1f-d57550cc96cc" xsi:nil="true"/>
-    <TPLaunchHelpLink xmlns="4873beb7-5857-4685-be1f-d57550cc96cc" xsi:nil="true"/>
-    <LocComments xmlns="4873beb7-5857-4685-be1f-d57550cc96cc" xsi:nil="true"/>
-    <LocRecommendedHandoff xmlns="4873beb7-5857-4685-be1f-d57550cc96cc" xsi:nil="true"/>
-    <SourceTitle xmlns="4873beb7-5857-4685-be1f-d57550cc96cc" xsi:nil="true"/>
-    <CSXUpdate xmlns="4873beb7-5857-4685-be1f-d57550cc96cc">false</CSXUpdate>
-    <IntlLocPriority xmlns="4873beb7-5857-4685-be1f-d57550cc96cc" xsi:nil="true"/>
-    <UAProjectedTotalWords xmlns="4873beb7-5857-4685-be1f-d57550cc96cc" xsi:nil="true"/>
-    <AssetType xmlns="4873beb7-5857-4685-be1f-d57550cc96cc">TP</AssetType>
-    <MachineTranslated xmlns="4873beb7-5857-4685-be1f-d57550cc96cc">false</MachineTranslated>
-    <OutputCachingOn xmlns="4873beb7-5857-4685-be1f-d57550cc96cc">false</OutputCachingOn>
-    <TemplateStatus xmlns="4873beb7-5857-4685-be1f-d57550cc96cc">Complete</TemplateStatus>
-    <IsSearchable xmlns="4873beb7-5857-4685-be1f-d57550cc96cc">true</IsSearchable>
-    <ContentItem xmlns="4873beb7-5857-4685-be1f-d57550cc96cc" xsi:nil="true"/>
-    <HandoffToMSDN xmlns="4873beb7-5857-4685-be1f-d57550cc96cc" xsi:nil="true"/>
-    <ShowIn xmlns="4873beb7-5857-4685-be1f-d57550cc96cc">Show everywhere</ShowIn>
-    <ThumbnailAssetId xmlns="4873beb7-5857-4685-be1f-d57550cc96cc" xsi:nil="true"/>
-    <UALocComments xmlns="4873beb7-5857-4685-be1f-d57550cc96cc" xsi:nil="true"/>
-    <UALocRecommendation xmlns="4873beb7-5857-4685-be1f-d57550cc96cc">Localize</UALocRecommendation>
-    <LastModifiedDateTime xmlns="4873beb7-5857-4685-be1f-d57550cc96cc" xsi:nil="true"/>
-    <LegacyData xmlns="4873beb7-5857-4685-be1f-d57550cc96cc" xsi:nil="true"/>
-    <LocManualTestRequired xmlns="4873beb7-5857-4685-be1f-d57550cc96cc">false</LocManualTestRequired>
-    <LocMarketGroupTiers2 xmlns="4873beb7-5857-4685-be1f-d57550cc96cc" xsi:nil="true"/>
-    <ClipArtFilename xmlns="4873beb7-5857-4685-be1f-d57550cc96cc" xsi:nil="true"/>
-    <TPApplication xmlns="4873beb7-5857-4685-be1f-d57550cc96cc" xsi:nil="true"/>
-    <CSXHash xmlns="4873beb7-5857-4685-be1f-d57550cc96cc" xsi:nil="true"/>
-    <DirectSourceMarket xmlns="4873beb7-5857-4685-be1f-d57550cc96cc" xsi:nil="true"/>
-    <PrimaryImageGen xmlns="4873beb7-5857-4685-be1f-d57550cc96cc">true</PrimaryImageGen>
-    <PlannedPubDate xmlns="4873beb7-5857-4685-be1f-d57550cc96cc" xsi:nil="true"/>
-    <CSXSubmissionMarket xmlns="4873beb7-5857-4685-be1f-d57550cc96cc" xsi:nil="true"/>
-    <Downloads xmlns="4873beb7-5857-4685-be1f-d57550cc96cc">0</Downloads>
-    <ArtSampleDocs xmlns="4873beb7-5857-4685-be1f-d57550cc96cc" xsi:nil="true"/>
-    <TrustLevel xmlns="4873beb7-5857-4685-be1f-d57550cc96cc">1 Microsoft Managed Content</TrustLevel>
-    <BlockPublish xmlns="4873beb7-5857-4685-be1f-d57550cc96cc">false</BlockPublish>
-    <TPLaunchHelpLinkType xmlns="4873beb7-5857-4685-be1f-d57550cc96cc">Template</TPLaunchHelpLinkType>
-    <LocalizationTagsTaxHTField0 xmlns="4873beb7-5857-4685-be1f-d57550cc96cc">
-      <Terms xmlns="http://schemas.microsoft.com/office/infopath/2007/PartnerControls"/>
-    </LocalizationTagsTaxHTField0>
-    <BusinessGroup xmlns="4873beb7-5857-4685-be1f-d57550cc96cc" xsi:nil="true"/>
-    <Providers xmlns="4873beb7-5857-4685-be1f-d57550cc96cc" xsi:nil="true"/>
-    <TemplateTemplateType xmlns="4873beb7-5857-4685-be1f-d57550cc96cc">PowerPoint Presentation Template</TemplateTemplateType>
-    <TimesCloned xmlns="4873beb7-5857-4685-be1f-d57550cc96cc" xsi:nil="true"/>
-    <TPAppVersion xmlns="4873beb7-5857-4685-be1f-d57550cc96cc" xsi:nil="true"/>
-    <VoteCount xmlns="4873beb7-5857-4685-be1f-d57550cc96cc" xsi:nil="true"/>
-    <AverageRating xmlns="4873beb7-5857-4685-be1f-d57550cc96cc" xsi:nil="true"/>
-    <FeatureTagsTaxHTField0 xmlns="4873beb7-5857-4685-be1f-d57550cc96cc">
-      <Terms xmlns="http://schemas.microsoft.com/office/infopath/2007/PartnerControls"/>
-    </FeatureTagsTaxHTField0>
-    <Provider xmlns="4873beb7-5857-4685-be1f-d57550cc96cc" xsi:nil="true"/>
-    <UACurrentWords xmlns="4873beb7-5857-4685-be1f-d57550cc96cc" xsi:nil="true"/>
-    <AssetId xmlns="4873beb7-5857-4685-be1f-d57550cc96cc">TP103431361</AssetId>
-    <TPClientViewer xmlns="4873beb7-5857-4685-be1f-d57550cc96cc" xsi:nil="true"/>
-    <DSATActionTaken xmlns="4873beb7-5857-4685-be1f-d57550cc96cc" xsi:nil="true"/>
-    <APEditor xmlns="4873beb7-5857-4685-be1f-d57550cc96cc">
-      <UserInfo>
-        <DisplayName/>
-        <AccountId xsi:nil="true"/>
-        <AccountType/>
-      </UserInfo>
-    </APEditor>
-    <TPInstallLocation xmlns="4873beb7-5857-4685-be1f-d57550cc96cc" xsi:nil="true"/>
-    <OOCacheId xmlns="4873beb7-5857-4685-be1f-d57550cc96cc" xsi:nil="true"/>
-    <IsDeleted xmlns="4873beb7-5857-4685-be1f-d57550cc96cc">false</IsDeleted>
-    <PublishTargets xmlns="4873beb7-5857-4685-be1f-d57550cc96cc">OfficeOnlineVNext</PublishTargets>
-    <ApprovalLog xmlns="4873beb7-5857-4685-be1f-d57550cc96cc" xsi:nil="true"/>
-    <BugNumber xmlns="4873beb7-5857-4685-be1f-d57550cc96cc" xsi:nil="true"/>
-    <CrawlForDependencies xmlns="4873beb7-5857-4685-be1f-d57550cc96cc">false</CrawlForDependencies>
-    <InternalTagsTaxHTField0 xmlns="4873beb7-5857-4685-be1f-d57550cc96cc">
-      <Terms xmlns="http://schemas.microsoft.com/office/infopath/2007/PartnerControls"/>
-    </InternalTagsTaxHTField0>
-    <LastHandOff xmlns="4873beb7-5857-4685-be1f-d57550cc96cc" xsi:nil="true"/>
-    <Milestone xmlns="4873beb7-5857-4685-be1f-d57550cc96cc" xsi:nil="true"/>
-    <OriginalRelease xmlns="4873beb7-5857-4685-be1f-d57550cc96cc">15</OriginalRelease>
-    <RecommendationsModifier xmlns="4873beb7-5857-4685-be1f-d57550cc96cc" xsi:nil="true"/>
-    <ScenarioTagsTaxHTField0 xmlns="4873beb7-5857-4685-be1f-d57550cc96cc">
-      <Terms xmlns="http://schemas.microsoft.com/office/infopath/2007/PartnerControls"/>
-    </ScenarioTagsTaxHTField0>
-    <UANotes xmlns="4873beb7-5857-4685-be1f-d57550cc96cc" xsi:nil="true"/>
-  </documentManagement>
-</p:properties>
-</file>
-
 <file path=customXml/item3.xml><?xml version="1.0" encoding="utf-8"?>
 <?mso-contentType ?>
 <FormTemplates xmlns="http://schemas.microsoft.com/sharepoint/v3/contenttype/forms">
@@ -8083,6 +8170,22 @@
 </file>
 
 <file path=customXml/itemProps1.xml><?xml version="1.0" encoding="utf-8"?>
+<ds:datastoreItem xmlns:ds="http://schemas.openxmlformats.org/officeDocument/2006/customXml" ds:itemID="{8CDDBB83-77C1-4099-A0AA-289882E745E2}">
+  <ds:schemaRefs>
+    <ds:schemaRef ds:uri="http://purl.org/dc/elements/1.1/"/>
+    <ds:schemaRef ds:uri="http://schemas.microsoft.com/office/2006/metadata/properties"/>
+    <ds:schemaRef ds:uri="4873beb7-5857-4685-be1f-d57550cc96cc"/>
+    <ds:schemaRef ds:uri="http://schemas.openxmlformats.org/package/2006/metadata/core-properties"/>
+    <ds:schemaRef ds:uri="http://purl.org/dc/terms/"/>
+    <ds:schemaRef ds:uri="http://schemas.microsoft.com/office/2006/documentManagement/types"/>
+    <ds:schemaRef ds:uri="http://schemas.microsoft.com/office/infopath/2007/PartnerControls"/>
+    <ds:schemaRef ds:uri="http://www.w3.org/XML/1998/namespace"/>
+    <ds:schemaRef ds:uri="http://purl.org/dc/dcmitype/"/>
+  </ds:schemaRefs>
+</ds:datastoreItem>
+</file>
+
+<file path=customXml/itemProps2.xml><?xml version="1.0" encoding="utf-8"?>
 <ds:datastoreItem xmlns:ds="http://schemas.openxmlformats.org/officeDocument/2006/customXml" ds:itemID="{28C8B9CA-0273-4370-889A-FC05DA5C2FA5}">
   <ds:schemaRefs>
     <ds:schemaRef ds:uri="http://schemas.microsoft.com/office/2006/metadata/contentType"/>
@@ -8100,22 +8203,6 @@
 </ds:datastoreItem>
 </file>
 
-<file path=customXml/itemProps2.xml><?xml version="1.0" encoding="utf-8"?>
-<ds:datastoreItem xmlns:ds="http://schemas.openxmlformats.org/officeDocument/2006/customXml" ds:itemID="{8CDDBB83-77C1-4099-A0AA-289882E745E2}">
-  <ds:schemaRefs>
-    <ds:schemaRef ds:uri="http://purl.org/dc/elements/1.1/"/>
-    <ds:schemaRef ds:uri="http://schemas.microsoft.com/office/2006/metadata/properties"/>
-    <ds:schemaRef ds:uri="4873beb7-5857-4685-be1f-d57550cc96cc"/>
-    <ds:schemaRef ds:uri="http://schemas.openxmlformats.org/package/2006/metadata/core-properties"/>
-    <ds:schemaRef ds:uri="http://purl.org/dc/terms/"/>
-    <ds:schemaRef ds:uri="http://schemas.microsoft.com/office/2006/documentManagement/types"/>
-    <ds:schemaRef ds:uri="http://schemas.microsoft.com/office/infopath/2007/PartnerControls"/>
-    <ds:schemaRef ds:uri="http://www.w3.org/XML/1998/namespace"/>
-    <ds:schemaRef ds:uri="http://purl.org/dc/dcmitype/"/>
-  </ds:schemaRefs>
-</ds:datastoreItem>
-</file>
-
 <file path=customXml/itemProps3.xml><?xml version="1.0" encoding="utf-8"?>
 <ds:datastoreItem xmlns:ds="http://schemas.openxmlformats.org/officeDocument/2006/customXml" ds:itemID="{561E720F-F05D-4536-9C34-0CFCED65D3B7}">
   <ds:schemaRefs>

</xml_diff>

<commit_message>
image clickable dans l'accueil et la liste + changement PowerPoint
</commit_message>
<xml_diff>
--- a/document/presentationSitePerso.pptx
+++ b/document/presentationSitePerso.pptx
@@ -16,8 +16,8 @@
     <p:sldId id="262" r:id="rId7"/>
     <p:sldId id="258" r:id="rId8"/>
     <p:sldId id="259" r:id="rId9"/>
-    <p:sldId id="260" r:id="rId10"/>
-    <p:sldId id="261" r:id="rId11"/>
+    <p:sldId id="261" r:id="rId10"/>
+    <p:sldId id="260" r:id="rId11"/>
     <p:sldId id="263" r:id="rId12"/>
     <p:sldId id="264" r:id="rId13"/>
   </p:sldIdLst>
@@ -224,7 +224,7 @@
             <a:pPr rtl="0"/>
             <a:fld id="{457283C4-69C4-4B10-9EB4-C99EB4AB0E72}" type="datetime1">
               <a:rPr lang="fr-FR" smtClean="0"/>
-              <a:t>17/10/2022</a:t>
+              <a:t>20/10/2022</a:t>
             </a:fld>
             <a:endParaRPr lang="fr-FR"/>
           </a:p>
@@ -394,7 +394,7 @@
             <a:pPr rtl="0"/>
             <a:fld id="{E7D04816-4A16-4B9A-8B75-D40768E67554}" type="datetime1">
               <a:rPr lang="fr-FR" noProof="0" smtClean="0"/>
-              <a:t>17/10/2022</a:t>
+              <a:t>20/10/2022</a:t>
             </a:fld>
             <a:endParaRPr lang="fr-FR" noProof="0"/>
           </a:p>
@@ -1134,7 +1134,7 @@
             <a:pPr rtl="0"/>
             <a:fld id="{F4839ECD-B0F4-4E9C-8A41-C7FF6F05ABC7}" type="datetime1">
               <a:rPr lang="fr-FR" noProof="0" smtClean="0"/>
-              <a:t>17/10/2022</a:t>
+              <a:t>20/10/2022</a:t>
             </a:fld>
             <a:endParaRPr lang="fr-FR" noProof="0"/>
           </a:p>
@@ -1431,7 +1431,7 @@
             <a:pPr rtl="0"/>
             <a:fld id="{3B7C5CE0-6D1B-424F-996A-7CF1236C9093}" type="datetime1">
               <a:rPr lang="fr-FR" noProof="0" smtClean="0"/>
-              <a:t>17/10/2022</a:t>
+              <a:t>20/10/2022</a:t>
             </a:fld>
             <a:endParaRPr lang="fr-FR" noProof="0"/>
           </a:p>
@@ -1636,7 +1636,7 @@
             <a:pPr rtl="0"/>
             <a:fld id="{4BBCED7F-8361-4784-80FC-58B2367AC205}" type="datetime1">
               <a:rPr lang="fr-FR" noProof="0" smtClean="0"/>
-              <a:t>17/10/2022</a:t>
+              <a:t>20/10/2022</a:t>
             </a:fld>
             <a:endParaRPr lang="fr-FR" noProof="0"/>
           </a:p>
@@ -1889,7 +1889,7 @@
             <a:pPr rtl="0"/>
             <a:fld id="{FCC782E0-924C-4C80-878E-1A91F4E2D435}" type="datetime1">
               <a:rPr lang="fr-FR" smtClean="0"/>
-              <a:t>17/10/2022</a:t>
+              <a:t>20/10/2022</a:t>
             </a:fld>
             <a:endParaRPr lang="fr-FR" dirty="0"/>
           </a:p>
@@ -2160,7 +2160,7 @@
             <a:pPr rtl="0"/>
             <a:fld id="{9B246BB8-95D5-4925-A156-AFC4162AE5A9}" type="datetime1">
               <a:rPr lang="fr-FR" noProof="0" smtClean="0"/>
-              <a:t>17/10/2022</a:t>
+              <a:t>20/10/2022</a:t>
             </a:fld>
             <a:endParaRPr lang="fr-FR" noProof="0"/>
           </a:p>
@@ -3192,7 +3192,7 @@
             <a:pPr rtl="0"/>
             <a:fld id="{EE95B23C-F89E-4A0C-B025-739D1C093814}" type="datetime1">
               <a:rPr lang="fr-FR" noProof="0" smtClean="0"/>
-              <a:t>17/10/2022</a:t>
+              <a:t>20/10/2022</a:t>
             </a:fld>
             <a:endParaRPr lang="fr-FR" noProof="0"/>
           </a:p>
@@ -3466,7 +3466,7 @@
             <a:pPr rtl="0"/>
             <a:fld id="{157D3DD3-58BE-41AA-B645-7E41A687D1FB}" type="datetime1">
               <a:rPr lang="fr-FR" noProof="0" smtClean="0"/>
-              <a:t>17/10/2022</a:t>
+              <a:t>20/10/2022</a:t>
             </a:fld>
             <a:endParaRPr lang="fr-FR" noProof="0"/>
           </a:p>
@@ -3847,7 +3847,7 @@
             <a:pPr rtl="0"/>
             <a:fld id="{AB2A5C24-7937-4C9A-B774-F693B38FC3A3}" type="datetime1">
               <a:rPr lang="fr-FR" noProof="0" smtClean="0"/>
-              <a:t>17/10/2022</a:t>
+              <a:t>20/10/2022</a:t>
             </a:fld>
             <a:endParaRPr lang="fr-FR" noProof="0"/>
           </a:p>
@@ -3980,7 +3980,7 @@
             <a:pPr rtl="0"/>
             <a:fld id="{B79A013D-9941-4648-9393-6D6C3D9A3531}" type="datetime1">
               <a:rPr lang="fr-FR" noProof="0" smtClean="0"/>
-              <a:t>17/10/2022</a:t>
+              <a:t>20/10/2022</a:t>
             </a:fld>
             <a:endParaRPr lang="fr-FR" noProof="0"/>
           </a:p>
@@ -4090,7 +4090,7 @@
             <a:pPr rtl="0"/>
             <a:fld id="{62DD9261-D922-4D8A-993C-015074B78B12}" type="datetime1">
               <a:rPr lang="fr-FR" noProof="0" smtClean="0"/>
-              <a:t>17/10/2022</a:t>
+              <a:t>20/10/2022</a:t>
             </a:fld>
             <a:endParaRPr lang="fr-FR" noProof="0"/>
           </a:p>
@@ -4383,7 +4383,7 @@
             <a:pPr rtl="0"/>
             <a:fld id="{6540C66C-A21E-4010-856D-58DDEC1C5A07}" type="datetime1">
               <a:rPr lang="fr-FR" noProof="0" smtClean="0"/>
-              <a:t>17/10/2022</a:t>
+              <a:t>20/10/2022</a:t>
             </a:fld>
             <a:endParaRPr lang="fr-FR" noProof="0"/>
           </a:p>
@@ -4638,7 +4638,7 @@
             <a:pPr rtl="0"/>
             <a:fld id="{7ED33F8C-BA28-4341-BFF2-691DB4C88DBD}" type="datetime1">
               <a:rPr lang="fr-FR" noProof="0" smtClean="0"/>
-              <a:t>17/10/2022</a:t>
+              <a:t>20/10/2022</a:t>
             </a:fld>
             <a:endParaRPr lang="fr-FR" noProof="0"/>
           </a:p>
@@ -5357,17 +5357,16 @@
             </a:r>
           </a:p>
           <a:p>
+            <a:r>
+              <a:rPr lang="fr-FR" dirty="0"/>
+              <a:t>Démonstration</a:t>
+            </a:r>
+          </a:p>
+          <a:p>
             <a:pPr rtl="0"/>
             <a:r>
               <a:rPr lang="fr-FR" dirty="0"/>
               <a:t>Difficultés rencontrée </a:t>
-            </a:r>
-          </a:p>
-          <a:p>
-            <a:pPr rtl="0"/>
-            <a:r>
-              <a:rPr lang="fr-FR" dirty="0"/>
-              <a:t>Démonstration</a:t>
             </a:r>
           </a:p>
           <a:p>
@@ -5485,6 +5484,20 @@
           <a:p>
             <a:r>
               <a:rPr lang="fr-CH" dirty="0"/>
+              <a:t>3</a:t>
+            </a:r>
+            <a:r>
+              <a:rPr lang="fr-CH" baseline="30000" dirty="0"/>
+              <a:t>ème</a:t>
+            </a:r>
+            <a:r>
+              <a:rPr lang="fr-CH" dirty="0"/>
+              <a:t> version</a:t>
+            </a:r>
+          </a:p>
+          <a:p>
+            <a:r>
+              <a:rPr lang="fr-CH" dirty="0"/>
               <a:t>Obtenir des informations sur des livres</a:t>
             </a:r>
           </a:p>
@@ -5834,7 +5847,7 @@
           <p:cNvPr id="2" name="Titre 1">
             <a:extLst>
               <a:ext uri="{FF2B5EF4-FFF2-40B4-BE49-F238E27FC236}">
-                <a16:creationId xmlns:a16="http://schemas.microsoft.com/office/drawing/2014/main" id="{572EB1F9-4315-AF7A-5F34-DB43488E4FED}"/>
+                <a16:creationId xmlns:a16="http://schemas.microsoft.com/office/drawing/2014/main" id="{306DBB68-7D30-9840-AC2E-46C31B6CFC76}"/>
               </a:ext>
             </a:extLst>
           </p:cNvPr>
@@ -5851,49 +5864,8 @@
           <a:lstStyle/>
           <a:p>
             <a:r>
-              <a:rPr lang="fr-FR" dirty="0"/>
-              <a:t>Difficultés rencontrée </a:t>
-            </a:r>
-            <a:endParaRPr lang="fr-CH" dirty="0"/>
-          </a:p>
-        </p:txBody>
-      </p:sp>
-      <p:sp>
-        <p:nvSpPr>
-          <p:cNvPr id="3" name="Espace réservé du contenu 2">
-            <a:extLst>
-              <a:ext uri="{FF2B5EF4-FFF2-40B4-BE49-F238E27FC236}">
-                <a16:creationId xmlns:a16="http://schemas.microsoft.com/office/drawing/2014/main" id="{DBCB916F-4123-47B4-7712-B5FEA03346C0}"/>
-              </a:ext>
-            </a:extLst>
-          </p:cNvPr>
-          <p:cNvSpPr>
-            <a:spLocks noGrp="1"/>
-          </p:cNvSpPr>
-          <p:nvPr>
-            <p:ph idx="1"/>
-          </p:nvPr>
-        </p:nvSpPr>
-        <p:spPr/>
-        <p:txBody>
-          <a:bodyPr/>
-          <a:lstStyle/>
-          <a:p>
-            <a:r>
               <a:rPr lang="fr-CH" dirty="0"/>
-              <a:t>Droit de suppression d’image</a:t>
-            </a:r>
-          </a:p>
-          <a:p>
-            <a:r>
-              <a:rPr lang="fr-CH" dirty="0"/>
-              <a:t>Compréhension et application de MVC</a:t>
-            </a:r>
-          </a:p>
-          <a:p>
-            <a:r>
-              <a:rPr lang="fr-CH" dirty="0"/>
-              <a:t>WSL</a:t>
+              <a:t>Démonstration</a:t>
             </a:r>
           </a:p>
         </p:txBody>
@@ -5901,7 +5873,7 @@
     </p:spTree>
     <p:extLst>
       <p:ext uri="{BB962C8B-B14F-4D97-AF65-F5344CB8AC3E}">
-        <p14:creationId xmlns:p14="http://schemas.microsoft.com/office/powerpoint/2010/main" val="3211949179"/>
+        <p14:creationId xmlns:p14="http://schemas.microsoft.com/office/powerpoint/2010/main" val="1933742481"/>
       </p:ext>
     </p:extLst>
   </p:cSld>
@@ -5945,7 +5917,7 @@
           <p:cNvPr id="2" name="Titre 1">
             <a:extLst>
               <a:ext uri="{FF2B5EF4-FFF2-40B4-BE49-F238E27FC236}">
-                <a16:creationId xmlns:a16="http://schemas.microsoft.com/office/drawing/2014/main" id="{306DBB68-7D30-9840-AC2E-46C31B6CFC76}"/>
+                <a16:creationId xmlns:a16="http://schemas.microsoft.com/office/drawing/2014/main" id="{572EB1F9-4315-AF7A-5F34-DB43488E4FED}"/>
               </a:ext>
             </a:extLst>
           </p:cNvPr>
@@ -5962,8 +5934,49 @@
           <a:lstStyle/>
           <a:p>
             <a:r>
+              <a:rPr lang="fr-FR" dirty="0"/>
+              <a:t>Difficultés rencontrée </a:t>
+            </a:r>
+            <a:endParaRPr lang="fr-CH" dirty="0"/>
+          </a:p>
+        </p:txBody>
+      </p:sp>
+      <p:sp>
+        <p:nvSpPr>
+          <p:cNvPr id="3" name="Espace réservé du contenu 2">
+            <a:extLst>
+              <a:ext uri="{FF2B5EF4-FFF2-40B4-BE49-F238E27FC236}">
+                <a16:creationId xmlns:a16="http://schemas.microsoft.com/office/drawing/2014/main" id="{DBCB916F-4123-47B4-7712-B5FEA03346C0}"/>
+              </a:ext>
+            </a:extLst>
+          </p:cNvPr>
+          <p:cNvSpPr>
+            <a:spLocks noGrp="1"/>
+          </p:cNvSpPr>
+          <p:nvPr>
+            <p:ph idx="1"/>
+          </p:nvPr>
+        </p:nvSpPr>
+        <p:spPr/>
+        <p:txBody>
+          <a:bodyPr/>
+          <a:lstStyle/>
+          <a:p>
+            <a:r>
               <a:rPr lang="fr-CH" dirty="0"/>
-              <a:t>Démonstration</a:t>
+              <a:t>Droit de suppression d’image</a:t>
+            </a:r>
+          </a:p>
+          <a:p>
+            <a:r>
+              <a:rPr lang="fr-CH" dirty="0"/>
+              <a:t>Compréhension et application de MVC</a:t>
+            </a:r>
+          </a:p>
+          <a:p>
+            <a:r>
+              <a:rPr lang="fr-CH" dirty="0"/>
+              <a:t>WSL</a:t>
             </a:r>
           </a:p>
         </p:txBody>
@@ -5971,7 +5984,7 @@
     </p:spTree>
     <p:extLst>
       <p:ext uri="{BB962C8B-B14F-4D97-AF65-F5344CB8AC3E}">
-        <p14:creationId xmlns:p14="http://schemas.microsoft.com/office/powerpoint/2010/main" val="1933742481"/>
+        <p14:creationId xmlns:p14="http://schemas.microsoft.com/office/powerpoint/2010/main" val="3211949179"/>
       </p:ext>
     </p:extLst>
   </p:cSld>

</xml_diff>